<commit_message>
Add sequence diagram for adding customize property
</commit_message>
<xml_diff>
--- a/docs/diagrams/UndoRedoSequenceDiagram.pptx
+++ b/docs/diagrams/UndoRedoSequenceDiagram.pptx
@@ -126,6 +126,10 @@
 </p:presentation>
 </file>
 
+<file path=ppt/revisionInfo.xml><?xml version="1.0" encoding="utf-8"?>
+<p1510:revInfo xmlns:a="http://schemas.openxmlformats.org/drawingml/2006/main" xmlns:r="http://schemas.openxmlformats.org/officeDocument/2006/relationships" xmlns:p1510="http://schemas.microsoft.com/office/powerpoint/2015/10/main"/>
+</file>
+
 <file path=ppt/notesMasters/notesMaster1.xml><?xml version="1.0" encoding="utf-8"?>
 <p:notesMaster xmlns:a="http://schemas.openxmlformats.org/drawingml/2006/main" xmlns:r="http://schemas.openxmlformats.org/officeDocument/2006/relationships" xmlns:p="http://schemas.openxmlformats.org/presentationml/2006/main">
   <p:cSld>
@@ -208,7 +212,7 @@
           <a:p>
             <a:fld id="{F5CC4B3F-88C1-4FFA-B1B6-F41C21DC6924}" type="datetimeFigureOut">
               <a:rPr lang="en-US" smtClean="0"/>
-              <a:t>7/29/2017</a:t>
+              <a:t>10/22/2017</a:t>
             </a:fld>
             <a:endParaRPr lang="en-US"/>
           </a:p>
@@ -654,7 +658,7 @@
           <a:p>
             <a:fld id="{78C97017-6FC3-485B-9764-EAC9E56C1D49}" type="datetimeFigureOut">
               <a:rPr lang="en-US" smtClean="0"/>
-              <a:t>7/29/2017</a:t>
+              <a:t>10/22/2017</a:t>
             </a:fld>
             <a:endParaRPr lang="en-US"/>
           </a:p>
@@ -822,7 +826,7 @@
           <a:p>
             <a:fld id="{78C97017-6FC3-485B-9764-EAC9E56C1D49}" type="datetimeFigureOut">
               <a:rPr lang="en-US" smtClean="0"/>
-              <a:t>7/29/2017</a:t>
+              <a:t>10/22/2017</a:t>
             </a:fld>
             <a:endParaRPr lang="en-US"/>
           </a:p>
@@ -1000,7 +1004,7 @@
           <a:p>
             <a:fld id="{78C97017-6FC3-485B-9764-EAC9E56C1D49}" type="datetimeFigureOut">
               <a:rPr lang="en-US" smtClean="0"/>
-              <a:t>7/29/2017</a:t>
+              <a:t>10/22/2017</a:t>
             </a:fld>
             <a:endParaRPr lang="en-US"/>
           </a:p>
@@ -1168,7 +1172,7 @@
           <a:p>
             <a:fld id="{78C97017-6FC3-485B-9764-EAC9E56C1D49}" type="datetimeFigureOut">
               <a:rPr lang="en-US" smtClean="0"/>
-              <a:t>7/29/2017</a:t>
+              <a:t>10/22/2017</a:t>
             </a:fld>
             <a:endParaRPr lang="en-US"/>
           </a:p>
@@ -1413,7 +1417,7 @@
           <a:p>
             <a:fld id="{78C97017-6FC3-485B-9764-EAC9E56C1D49}" type="datetimeFigureOut">
               <a:rPr lang="en-US" smtClean="0"/>
-              <a:t>7/29/2017</a:t>
+              <a:t>10/22/2017</a:t>
             </a:fld>
             <a:endParaRPr lang="en-US"/>
           </a:p>
@@ -1698,7 +1702,7 @@
           <a:p>
             <a:fld id="{78C97017-6FC3-485B-9764-EAC9E56C1D49}" type="datetimeFigureOut">
               <a:rPr lang="en-US" smtClean="0"/>
-              <a:t>7/29/2017</a:t>
+              <a:t>10/22/2017</a:t>
             </a:fld>
             <a:endParaRPr lang="en-US"/>
           </a:p>
@@ -2117,7 +2121,7 @@
           <a:p>
             <a:fld id="{78C97017-6FC3-485B-9764-EAC9E56C1D49}" type="datetimeFigureOut">
               <a:rPr lang="en-US" smtClean="0"/>
-              <a:t>7/29/2017</a:t>
+              <a:t>10/22/2017</a:t>
             </a:fld>
             <a:endParaRPr lang="en-US"/>
           </a:p>
@@ -2234,7 +2238,7 @@
           <a:p>
             <a:fld id="{78C97017-6FC3-485B-9764-EAC9E56C1D49}" type="datetimeFigureOut">
               <a:rPr lang="en-US" smtClean="0"/>
-              <a:t>7/29/2017</a:t>
+              <a:t>10/22/2017</a:t>
             </a:fld>
             <a:endParaRPr lang="en-US"/>
           </a:p>
@@ -2329,7 +2333,7 @@
           <a:p>
             <a:fld id="{78C97017-6FC3-485B-9764-EAC9E56C1D49}" type="datetimeFigureOut">
               <a:rPr lang="en-US" smtClean="0"/>
-              <a:t>7/29/2017</a:t>
+              <a:t>10/22/2017</a:t>
             </a:fld>
             <a:endParaRPr lang="en-US"/>
           </a:p>
@@ -2604,7 +2608,7 @@
           <a:p>
             <a:fld id="{78C97017-6FC3-485B-9764-EAC9E56C1D49}" type="datetimeFigureOut">
               <a:rPr lang="en-US" smtClean="0"/>
-              <a:t>7/29/2017</a:t>
+              <a:t>10/22/2017</a:t>
             </a:fld>
             <a:endParaRPr lang="en-US"/>
           </a:p>
@@ -2856,7 +2860,7 @@
           <a:p>
             <a:fld id="{78C97017-6FC3-485B-9764-EAC9E56C1D49}" type="datetimeFigureOut">
               <a:rPr lang="en-US" smtClean="0"/>
-              <a:t>7/29/2017</a:t>
+              <a:t>10/22/2017</a:t>
             </a:fld>
             <a:endParaRPr lang="en-US"/>
           </a:p>
@@ -3067,7 +3071,7 @@
           <a:p>
             <a:fld id="{78C97017-6FC3-485B-9764-EAC9E56C1D49}" type="datetimeFigureOut">
               <a:rPr lang="en-US" smtClean="0"/>
-              <a:t>7/29/2017</a:t>
+              <a:t>10/22/2017</a:t>
             </a:fld>
             <a:endParaRPr lang="en-US"/>
           </a:p>
@@ -3450,7 +3454,7 @@
         </p:nvSpPr>
         <p:spPr>
           <a:xfrm>
-            <a:off x="723900" y="228600"/>
+            <a:off x="260860" y="914400"/>
             <a:ext cx="8847118" cy="4343400"/>
           </a:xfrm>
           <a:prstGeom prst="roundRect">
@@ -3511,7 +3515,7 @@
         </p:nvSpPr>
         <p:spPr>
           <a:xfrm>
-            <a:off x="883145" y="543946"/>
+            <a:off x="420105" y="1229746"/>
             <a:ext cx="1455629" cy="346760"/>
           </a:xfrm>
           <a:prstGeom prst="rect">
@@ -3580,7 +3584,7 @@
         </p:nvCxnSpPr>
         <p:spPr>
           <a:xfrm>
-            <a:off x="1610959" y="907617"/>
+            <a:off x="1147919" y="1593417"/>
             <a:ext cx="0" cy="3481399"/>
           </a:xfrm>
           <a:prstGeom prst="line">
@@ -3617,7 +3621,7 @@
         </p:nvSpPr>
         <p:spPr>
           <a:xfrm>
-            <a:off x="1538951" y="1258311"/>
+            <a:off x="1075911" y="1944111"/>
             <a:ext cx="152400" cy="2932689"/>
           </a:xfrm>
           <a:prstGeom prst="rect">
@@ -3664,7 +3668,7 @@
         </p:nvSpPr>
         <p:spPr>
           <a:xfrm>
-            <a:off x="3437188" y="423022"/>
+            <a:off x="2974148" y="1108822"/>
             <a:ext cx="1219200" cy="467684"/>
           </a:xfrm>
           <a:prstGeom prst="rect">
@@ -3736,7 +3740,7 @@
         </p:nvCxnSpPr>
         <p:spPr>
           <a:xfrm>
-            <a:off x="4050587" y="907617"/>
+            <a:off x="3587547" y="1593417"/>
             <a:ext cx="0" cy="1482984"/>
           </a:xfrm>
           <a:prstGeom prst="line">
@@ -3773,7 +3777,7 @@
         </p:nvSpPr>
         <p:spPr>
           <a:xfrm>
-            <a:off x="3978580" y="1365810"/>
+            <a:off x="3515540" y="2051610"/>
             <a:ext cx="154408" cy="767790"/>
           </a:xfrm>
           <a:prstGeom prst="rect">
@@ -3828,7 +3832,7 @@
         </p:nvCxnSpPr>
         <p:spPr>
           <a:xfrm>
-            <a:off x="5602082" y="1613633"/>
+            <a:off x="5139042" y="2299433"/>
             <a:ext cx="0" cy="2644578"/>
           </a:xfrm>
           <a:prstGeom prst="line">
@@ -3865,7 +3869,7 @@
         </p:nvSpPr>
         <p:spPr>
           <a:xfrm>
-            <a:off x="5525882" y="1613633"/>
+            <a:off x="5062842" y="2299433"/>
             <a:ext cx="152400" cy="276003"/>
           </a:xfrm>
           <a:prstGeom prst="rect">
@@ -3912,7 +3916,7 @@
         </p:nvCxnSpPr>
         <p:spPr>
           <a:xfrm>
-            <a:off x="419100" y="1261999"/>
+            <a:off x="-43940" y="1947799"/>
             <a:ext cx="1119851" cy="0"/>
           </a:xfrm>
           <a:prstGeom prst="straightConnector1">
@@ -3948,7 +3952,7 @@
         </p:nvSpPr>
         <p:spPr>
           <a:xfrm>
-            <a:off x="38100" y="990600"/>
+            <a:off x="-424940" y="1676400"/>
             <a:ext cx="1424846" cy="215444"/>
           </a:xfrm>
           <a:prstGeom prst="rect">
@@ -3982,7 +3986,7 @@
         </p:nvCxnSpPr>
         <p:spPr>
           <a:xfrm flipV="1">
-            <a:off x="4135972" y="1512340"/>
+            <a:off x="3672932" y="2198140"/>
             <a:ext cx="922392" cy="1"/>
           </a:xfrm>
           <a:prstGeom prst="straightConnector1">
@@ -4018,7 +4022,7 @@
         </p:nvSpPr>
         <p:spPr>
           <a:xfrm>
-            <a:off x="3243421" y="2484071"/>
+            <a:off x="2780381" y="3169871"/>
             <a:ext cx="855809" cy="215444"/>
           </a:xfrm>
           <a:prstGeom prst="rect">
@@ -4058,7 +4062,7 @@
         </p:nvCxnSpPr>
         <p:spPr>
           <a:xfrm>
-            <a:off x="4109108" y="1878232"/>
+            <a:off x="3646068" y="2564032"/>
             <a:ext cx="1492974" cy="0"/>
           </a:xfrm>
           <a:prstGeom prst="straightConnector1">
@@ -4098,7 +4102,7 @@
         </p:nvCxnSpPr>
         <p:spPr>
           <a:xfrm>
-            <a:off x="1691351" y="2133600"/>
+            <a:off x="1228311" y="2819400"/>
             <a:ext cx="2348067" cy="0"/>
           </a:xfrm>
           <a:prstGeom prst="straightConnector1">
@@ -4136,7 +4140,7 @@
         </p:nvCxnSpPr>
         <p:spPr>
           <a:xfrm>
-            <a:off x="380999" y="4191000"/>
+            <a:off x="-82041" y="4876800"/>
             <a:ext cx="1196051" cy="0"/>
           </a:xfrm>
           <a:prstGeom prst="straightConnector1">
@@ -4174,7 +4178,7 @@
         </p:nvSpPr>
         <p:spPr>
           <a:xfrm>
-            <a:off x="5526488" y="2731313"/>
+            <a:off x="5063448" y="3417113"/>
             <a:ext cx="161322" cy="1307285"/>
           </a:xfrm>
           <a:prstGeom prst="rect">
@@ -4223,7 +4227,7 @@
         </p:nvCxnSpPr>
         <p:spPr>
           <a:xfrm>
-            <a:off x="5700333" y="3609800"/>
+            <a:off x="5237293" y="4295600"/>
             <a:ext cx="2813874" cy="0"/>
           </a:xfrm>
           <a:prstGeom prst="straightConnector1">
@@ -4259,7 +4263,7 @@
         </p:nvSpPr>
         <p:spPr>
           <a:xfrm>
-            <a:off x="5782732" y="2760996"/>
+            <a:off x="5319692" y="3446796"/>
             <a:ext cx="767033" cy="184666"/>
           </a:xfrm>
           <a:prstGeom prst="rect">
@@ -4303,7 +4307,7 @@
         </p:nvSpPr>
         <p:spPr>
           <a:xfrm>
-            <a:off x="1885189" y="1106150"/>
+            <a:off x="1422149" y="1791950"/>
             <a:ext cx="1899551" cy="215444"/>
           </a:xfrm>
           <a:prstGeom prst="rect">
@@ -4347,7 +4351,7 @@
         </p:nvSpPr>
         <p:spPr>
           <a:xfrm>
-            <a:off x="3272755" y="3791076"/>
+            <a:off x="2809715" y="4476876"/>
             <a:ext cx="621216" cy="215444"/>
           </a:xfrm>
           <a:prstGeom prst="rect">
@@ -4387,7 +4391,7 @@
         </p:nvSpPr>
         <p:spPr>
           <a:xfrm>
-            <a:off x="645270" y="3945901"/>
+            <a:off x="182230" y="4631701"/>
             <a:ext cx="762000" cy="215444"/>
           </a:xfrm>
           <a:prstGeom prst="rect">
@@ -4427,7 +4431,7 @@
         </p:nvSpPr>
         <p:spPr>
           <a:xfrm>
-            <a:off x="7826988" y="2782109"/>
+            <a:off x="7363948" y="3467909"/>
             <a:ext cx="1590354" cy="461538"/>
           </a:xfrm>
           <a:prstGeom prst="rect">
@@ -4486,7 +4490,7 @@
         </p:nvSpPr>
         <p:spPr>
           <a:xfrm>
-            <a:off x="8514207" y="3599229"/>
+            <a:off x="8051167" y="4285029"/>
             <a:ext cx="152400" cy="313845"/>
           </a:xfrm>
           <a:prstGeom prst="rect">
@@ -4535,7 +4539,7 @@
         </p:nvCxnSpPr>
         <p:spPr>
           <a:xfrm>
-            <a:off x="5685755" y="3899785"/>
+            <a:off x="5222715" y="4585585"/>
             <a:ext cx="2855065" cy="0"/>
           </a:xfrm>
           <a:prstGeom prst="straightConnector1">
@@ -4573,7 +4577,7 @@
         </p:nvSpPr>
         <p:spPr>
           <a:xfrm>
-            <a:off x="2724792" y="1905793"/>
+            <a:off x="2261752" y="2591593"/>
             <a:ext cx="220343" cy="215444"/>
           </a:xfrm>
           <a:prstGeom prst="rect">
@@ -4613,7 +4617,7 @@
         </p:nvSpPr>
         <p:spPr>
           <a:xfrm>
-            <a:off x="6059560" y="2230345"/>
+            <a:off x="5596520" y="2916145"/>
             <a:ext cx="1778201" cy="432035"/>
           </a:xfrm>
           <a:prstGeom prst="rect">
@@ -4682,7 +4686,7 @@
         </p:nvCxnSpPr>
         <p:spPr>
           <a:xfrm>
-            <a:off x="6990448" y="2653306"/>
+            <a:off x="6527408" y="3339106"/>
             <a:ext cx="0" cy="838201"/>
           </a:xfrm>
           <a:prstGeom prst="line">
@@ -4719,7 +4723,7 @@
         </p:nvSpPr>
         <p:spPr>
           <a:xfrm>
-            <a:off x="6887526" y="2958107"/>
+            <a:off x="6424486" y="3643907"/>
             <a:ext cx="217409" cy="351475"/>
           </a:xfrm>
           <a:prstGeom prst="rect">
@@ -4768,7 +4772,7 @@
         </p:nvCxnSpPr>
         <p:spPr>
           <a:xfrm>
-            <a:off x="5685755" y="2975344"/>
+            <a:off x="5222715" y="3661144"/>
             <a:ext cx="1210345" cy="0"/>
           </a:xfrm>
           <a:prstGeom prst="straightConnector1">
@@ -4804,7 +4808,7 @@
         </p:nvSpPr>
         <p:spPr>
           <a:xfrm>
-            <a:off x="5472880" y="4258211"/>
+            <a:off x="5009840" y="4944011"/>
             <a:ext cx="258404" cy="261610"/>
           </a:xfrm>
           <a:prstGeom prst="rect">
@@ -4837,7 +4841,7 @@
         </p:nvSpPr>
         <p:spPr>
           <a:xfrm>
-            <a:off x="5035976" y="1260268"/>
+            <a:off x="4572936" y="1946068"/>
             <a:ext cx="1093635" cy="461538"/>
           </a:xfrm>
           <a:prstGeom prst="rect">
@@ -4919,7 +4923,7 @@
         </p:nvCxnSpPr>
         <p:spPr>
           <a:xfrm>
-            <a:off x="1691351" y="2731314"/>
+            <a:off x="1228311" y="3417114"/>
             <a:ext cx="3832164" cy="1"/>
           </a:xfrm>
           <a:prstGeom prst="straightConnector1">
@@ -4963,7 +4967,7 @@
         </p:nvCxnSpPr>
         <p:spPr>
           <a:xfrm>
-            <a:off x="1708245" y="1363918"/>
+            <a:off x="1245205" y="2049718"/>
             <a:ext cx="2256705" cy="1"/>
           </a:xfrm>
           <a:prstGeom prst="straightConnector1">
@@ -5007,7 +5011,7 @@
         </p:nvCxnSpPr>
         <p:spPr>
           <a:xfrm>
-            <a:off x="1691998" y="4036462"/>
+            <a:off x="1228958" y="4722262"/>
             <a:ext cx="3831517" cy="0"/>
           </a:xfrm>
           <a:prstGeom prst="straightConnector1">
@@ -5053,7 +5057,7 @@
         </p:nvCxnSpPr>
         <p:spPr>
           <a:xfrm>
-            <a:off x="5731284" y="3302011"/>
+            <a:off x="5268244" y="3987811"/>
             <a:ext cx="1128490" cy="0"/>
           </a:xfrm>
           <a:prstGeom prst="straightConnector1">
@@ -5097,7 +5101,7 @@
         </p:nvSpPr>
         <p:spPr>
           <a:xfrm>
-            <a:off x="5968093" y="3100435"/>
+            <a:off x="5505053" y="3786235"/>
             <a:ext cx="767033" cy="184666"/>
           </a:xfrm>
           <a:prstGeom prst="rect">
@@ -5144,7 +5148,7 @@
         </p:nvSpPr>
         <p:spPr>
           <a:xfrm>
-            <a:off x="6071845" y="3425134"/>
+            <a:off x="5608805" y="4110934"/>
             <a:ext cx="767033" cy="184666"/>
           </a:xfrm>
           <a:prstGeom prst="rect">
@@ -5192,7 +5196,7 @@
         </p:nvCxnSpPr>
         <p:spPr>
           <a:xfrm>
-            <a:off x="8590407" y="3192768"/>
+            <a:off x="8127367" y="3878568"/>
             <a:ext cx="0" cy="1150632"/>
           </a:xfrm>
           <a:prstGeom prst="line">

</xml_diff>